<commit_message>
update schemas from Drive and rerun verification.
</commit_message>
<xml_diff>
--- a/hrf/business_change.pptx
+++ b/hrf/business_change.pptx
@@ -14830,7 +14830,7 @@
                   <a:schemeClr val="dk1"/>
                 </a:solidFill>
               </a:rPr>
-              <a:t>Antitrust Investigation</a:t>
+              <a:t>10497:Antitrust Investigation</a:t>
             </a:r>
             <a:r>
               <a:rPr b="0" i="0" lang="zh-CN" sz="1050" u="none" cap="none" strike="noStrike">
@@ -14881,7 +14881,7 @@
                   <a:schemeClr val="dk1"/>
                 </a:solidFill>
               </a:rPr>
-              <a:t>There is also a XOR version to indicate only one child answer.</a:t>
+              <a:t>There is also a XOR version (10500) to indicate only one child answer.</a:t>
             </a:r>
             <a:endParaRPr sz="1050">
               <a:solidFill>
@@ -14913,7 +14913,7 @@
                   <a:schemeClr val="dk1"/>
                 </a:solidFill>
               </a:rPr>
-              <a:t>agreement</a:t>
+              <a:t>10498:agreement</a:t>
             </a:r>
             <a:r>
               <a:rPr lang="zh-CN" sz="1050">
@@ -14953,7 +14953,7 @@
                   <a:schemeClr val="dk1"/>
                 </a:solidFill>
               </a:rPr>
-              <a:t>rejection</a:t>
+              <a:t>10499:rejection</a:t>
             </a:r>
             <a:r>
               <a:rPr lang="zh-CN" sz="1050">
@@ -14993,7 +14993,7 @@
                   <a:schemeClr val="dk1"/>
                 </a:solidFill>
               </a:rPr>
-              <a:t>divestment</a:t>
+              <a:t>10458:divestment</a:t>
             </a:r>
             <a:r>
               <a:rPr lang="zh-CN" sz="1050">
@@ -15033,7 +15033,7 @@
                   <a:schemeClr val="dk1"/>
                 </a:solidFill>
               </a:rPr>
-              <a:t>breakup</a:t>
+              <a:t>10496:breakup</a:t>
             </a:r>
             <a:r>
               <a:rPr lang="zh-CN" sz="1050">
@@ -15189,7 +15189,7 @@
         <p:spPr>
           <a:xfrm>
             <a:off x="311700" y="1120500"/>
-            <a:ext cx="3954600" cy="2576700"/>
+            <a:ext cx="3954600" cy="3134100"/>
           </a:xfrm>
           <a:prstGeom prst="rect">
             <a:avLst/>
@@ -15228,7 +15228,7 @@
                   <a:schemeClr val="dk1"/>
                 </a:solidFill>
               </a:rPr>
-              <a:t>divestment</a:t>
+              <a:t>10458:divestment</a:t>
             </a:r>
             <a:r>
               <a:rPr b="0" i="0" lang="zh-CN" sz="1050" u="none" cap="none" strike="noStrike">
@@ -15280,7 +15280,7 @@
                   <a:schemeClr val="dk1"/>
                 </a:solidFill>
               </a:rPr>
-              <a:t>Shutdown</a:t>
+              <a:t>10460:Shutdown</a:t>
             </a:r>
             <a:r>
               <a:rPr lang="zh-CN" sz="1050">
@@ -15320,7 +15320,7 @@
                   <a:schemeClr val="dk1"/>
                 </a:solidFill>
               </a:rPr>
-              <a:t>exchange of goods</a:t>
+              <a:t>10473:exchange of goods</a:t>
             </a:r>
             <a:r>
               <a:rPr lang="zh-CN" sz="1050">
@@ -15360,7 +15360,7 @@
                   <a:schemeClr val="dk1"/>
                 </a:solidFill>
               </a:rPr>
-              <a:t>breakup</a:t>
+              <a:t>10496:breakup</a:t>
             </a:r>
             <a:r>
               <a:rPr lang="zh-CN" sz="1050">
@@ -15400,7 +15400,7 @@
                   <a:schemeClr val="dk1"/>
                 </a:solidFill>
               </a:rPr>
-              <a:t>Privatize</a:t>
+              <a:t>10474:Privatize</a:t>
             </a:r>
             <a:r>
               <a:rPr lang="zh-CN" sz="1050">
@@ -15456,7 +15456,7 @@
                   <a:schemeClr val="dk1"/>
                 </a:solidFill>
               </a:rPr>
-              <a:t>Create Partnership</a:t>
+              <a:t>10481:Create Partnership</a:t>
             </a:r>
             <a:r>
               <a:rPr lang="zh-CN" sz="1050">
@@ -15496,7 +15496,7 @@
                   <a:schemeClr val="dk1"/>
                 </a:solidFill>
               </a:rPr>
-              <a:t>End Partnership</a:t>
+              <a:t>10482:End Partnership</a:t>
             </a:r>
             <a:r>
               <a:rPr lang="zh-CN" sz="1050">
@@ -15536,7 +15536,7 @@
                   <a:schemeClr val="dk1"/>
                 </a:solidFill>
               </a:rPr>
-              <a:t>Transfer Money</a:t>
+              <a:t>10477:Transfer Money</a:t>
             </a:r>
             <a:r>
               <a:rPr lang="zh-CN" sz="1050">
@@ -15576,7 +15576,7 @@
                   <a:schemeClr val="dk1"/>
                 </a:solidFill>
               </a:rPr>
-              <a:t>Reorganization</a:t>
+              <a:t>10461:Reorganization</a:t>
             </a:r>
             <a:r>
               <a:rPr lang="zh-CN" sz="1050">
@@ -15616,7 +15616,7 @@
                   <a:schemeClr val="dk1"/>
                 </a:solidFill>
               </a:rPr>
-              <a:t>dismissal</a:t>
+              <a:t>10504:dismissal</a:t>
             </a:r>
             <a:r>
               <a:rPr lang="zh-CN" sz="1050">
@@ -15884,7 +15884,7 @@
                   <a:schemeClr val="dk1"/>
                 </a:solidFill>
               </a:rPr>
-              <a:t>Scandal</a:t>
+              <a:t>10464:Scandal</a:t>
             </a:r>
             <a:r>
               <a:rPr b="0" i="0" lang="zh-CN" sz="1050" u="none" cap="none" strike="noStrike">
@@ -15940,7 +15940,7 @@
                   <a:schemeClr val="dk1"/>
                 </a:solidFill>
               </a:rPr>
-              <a:t>Investigation-&gt;Justice</a:t>
+              <a:t>10494:Investigation-&gt;10523:Justice</a:t>
             </a:r>
             <a:r>
               <a:rPr b="0" i="0" lang="zh-CN" sz="1050" u="none" cap="none" strike="noStrike">
@@ -15990,6 +15990,14 @@
               <a:buFont typeface="Arial"/>
               <a:buNone/>
             </a:pPr>
+            <a:r>
+              <a:rPr b="1" lang="zh-CN" sz="1050">
+                <a:solidFill>
+                  <a:schemeClr val="dk1"/>
+                </a:solidFill>
+              </a:rPr>
+              <a:t>10494:</a:t>
+            </a:r>
             <a:r>
               <a:rPr b="1" lang="zh-CN" sz="1050">
                 <a:solidFill>
@@ -16239,7 +16247,7 @@
                   <a:schemeClr val="dk1"/>
                 </a:solidFill>
               </a:rPr>
-              <a:t>Identifycategorize</a:t>
+              <a:t>10510:Identifycategorize</a:t>
             </a:r>
             <a:r>
               <a:rPr lang="zh-CN" sz="1050">
@@ -16279,7 +16287,7 @@
                   <a:schemeClr val="dk1"/>
                 </a:solidFill>
               </a:rPr>
-              <a:t>Contact</a:t>
+              <a:t>10511:Contact</a:t>
             </a:r>
             <a:r>
               <a:rPr lang="zh-CN" sz="1050">
@@ -16319,7 +16327,7 @@
                   <a:schemeClr val="dk1"/>
                 </a:solidFill>
               </a:rPr>
-              <a:t>Arrest</a:t>
+              <a:t>10512:Arrest</a:t>
             </a:r>
             <a:r>
               <a:rPr lang="zh-CN" sz="1050">
@@ -16359,7 +16367,7 @@
                   <a:schemeClr val="dk1"/>
                 </a:solidFill>
               </a:rPr>
-              <a:t>Handcuffing</a:t>
+              <a:t>10524:Handcuffing</a:t>
             </a:r>
             <a:r>
               <a:rPr lang="zh-CN" sz="1050">
@@ -16399,7 +16407,7 @@
                   <a:schemeClr val="dk1"/>
                 </a:solidFill>
               </a:rPr>
-              <a:t>Restrain</a:t>
+              <a:t>10526:Restrain</a:t>
             </a:r>
             <a:r>
               <a:rPr lang="zh-CN" sz="1050">
@@ -16439,7 +16447,7 @@
                   <a:schemeClr val="dk1"/>
                 </a:solidFill>
               </a:rPr>
-              <a:t>Interrogation</a:t>
+              <a:t>10525:Interrogation</a:t>
             </a:r>
             <a:r>
               <a:rPr lang="zh-CN" sz="1050">
@@ -16479,7 +16487,7 @@
                   <a:schemeClr val="dk1"/>
                 </a:solidFill>
               </a:rPr>
-              <a:t>Inspect</a:t>
+              <a:t>10513:Inspect</a:t>
             </a:r>
             <a:r>
               <a:rPr lang="zh-CN" sz="1050">
@@ -16728,6 +16736,14 @@
                   <a:schemeClr val="dk1"/>
                 </a:solidFill>
               </a:rPr>
+              <a:t>10514:</a:t>
+            </a:r>
+            <a:r>
+              <a:rPr b="1" lang="zh-CN" sz="1050">
+                <a:solidFill>
+                  <a:schemeClr val="dk1"/>
+                </a:solidFill>
+              </a:rPr>
               <a:t>Initiate Judicial Process</a:t>
             </a:r>
             <a:r>
@@ -16768,6 +16784,14 @@
                   <a:schemeClr val="dk1"/>
                 </a:solidFill>
               </a:rPr>
+              <a:t>10515:</a:t>
+            </a:r>
+            <a:r>
+              <a:rPr b="1" lang="zh-CN" sz="1050">
+                <a:solidFill>
+                  <a:schemeClr val="dk1"/>
+                </a:solidFill>
+              </a:rPr>
               <a:t>ChargeIndict</a:t>
             </a:r>
             <a:r>
@@ -16808,6 +16832,14 @@
                   <a:schemeClr val="dk1"/>
                 </a:solidFill>
               </a:rPr>
+              <a:t>10516:</a:t>
+            </a:r>
+            <a:r>
+              <a:rPr b="1" lang="zh-CN" sz="1050">
+                <a:solidFill>
+                  <a:schemeClr val="dk1"/>
+                </a:solidFill>
+              </a:rPr>
               <a:t>Trial</a:t>
             </a:r>
             <a:r>
@@ -16848,6 +16880,14 @@
                   <a:schemeClr val="dk1"/>
                 </a:solidFill>
               </a:rPr>
+              <a:t>10521:</a:t>
+            </a:r>
+            <a:r>
+              <a:rPr b="1" lang="zh-CN" sz="1050">
+                <a:solidFill>
+                  <a:schemeClr val="dk1"/>
+                </a:solidFill>
+              </a:rPr>
               <a:t>Acquit</a:t>
             </a:r>
             <a:r>
@@ -16888,6 +16928,14 @@
                   <a:schemeClr val="dk1"/>
                 </a:solidFill>
               </a:rPr>
+              <a:t>10517:</a:t>
+            </a:r>
+            <a:r>
+              <a:rPr b="1" lang="zh-CN" sz="1050">
+                <a:solidFill>
+                  <a:schemeClr val="dk1"/>
+                </a:solidFill>
+              </a:rPr>
               <a:t>Convict</a:t>
             </a:r>
             <a:r>
@@ -16928,6 +16976,14 @@
                   <a:schemeClr val="dk1"/>
                 </a:solidFill>
               </a:rPr>
+              <a:t>10518:</a:t>
+            </a:r>
+            <a:r>
+              <a:rPr b="1" lang="zh-CN" sz="1050">
+                <a:solidFill>
+                  <a:schemeClr val="dk1"/>
+                </a:solidFill>
+              </a:rPr>
               <a:t>Sentence</a:t>
             </a:r>
             <a:r>
@@ -16968,6 +17024,14 @@
                   <a:schemeClr val="dk1"/>
                 </a:solidFill>
               </a:rPr>
+              <a:t>10519:</a:t>
+            </a:r>
+            <a:r>
+              <a:rPr b="1" lang="zh-CN" sz="1050">
+                <a:solidFill>
+                  <a:schemeClr val="dk1"/>
+                </a:solidFill>
+              </a:rPr>
               <a:t>Detain</a:t>
             </a:r>
             <a:r>
@@ -17002,6 +17066,14 @@
               <a:buFont typeface="Arial"/>
               <a:buNone/>
             </a:pPr>
+            <a:r>
+              <a:rPr b="1" lang="zh-CN" sz="1050">
+                <a:solidFill>
+                  <a:schemeClr val="dk1"/>
+                </a:solidFill>
+              </a:rPr>
+              <a:t>10520:</a:t>
+            </a:r>
             <a:r>
               <a:rPr b="1" lang="zh-CN" sz="1050">
                 <a:solidFill>
@@ -17175,7 +17247,7 @@
                   <a:schemeClr val="dk1"/>
                 </a:solidFill>
               </a:rPr>
-              <a:t>Corporate Criminal Response</a:t>
+              <a:t>10492:Corporate Criminal Response</a:t>
             </a:r>
             <a:r>
               <a:rPr b="0" i="0" lang="zh-CN" sz="1050" u="none" cap="none" strike="noStrike">
@@ -17227,7 +17299,7 @@
                   <a:schemeClr val="dk1"/>
                 </a:solidFill>
               </a:rPr>
-              <a:t>CorporateCriminalXOR</a:t>
+              <a:t>10503:CorporateCriminalXOR</a:t>
             </a:r>
             <a:r>
               <a:rPr lang="zh-CN" sz="1050">
@@ -17267,7 +17339,7 @@
                   <a:schemeClr val="dk1"/>
                 </a:solidFill>
               </a:rPr>
-              <a:t>agreement</a:t>
+              <a:t>10501:agreement</a:t>
             </a:r>
             <a:r>
               <a:rPr lang="zh-CN" sz="1050">
@@ -17307,7 +17379,7 @@
                   <a:schemeClr val="dk1"/>
                 </a:solidFill>
               </a:rPr>
-              <a:t>rejection</a:t>
+              <a:t>10502:rejection</a:t>
             </a:r>
             <a:r>
               <a:rPr lang="zh-CN" sz="1050">
@@ -17347,7 +17419,7 @@
                   <a:schemeClr val="dk1"/>
                 </a:solidFill>
               </a:rPr>
-              <a:t>Corporate Justice</a:t>
+              <a:t>10465:Corporate Justice</a:t>
             </a:r>
             <a:r>
               <a:rPr lang="zh-CN" sz="1050">
@@ -17387,7 +17459,7 @@
                   <a:schemeClr val="dk1"/>
                 </a:solidFill>
               </a:rPr>
-              <a:t>breakup</a:t>
+              <a:t>10496:breakup</a:t>
             </a:r>
             <a:r>
               <a:rPr lang="zh-CN" sz="1050">
@@ -17427,7 +17499,7 @@
                   <a:schemeClr val="dk1"/>
                 </a:solidFill>
               </a:rPr>
-              <a:t>PoliticalCorruption</a:t>
+              <a:t>10466:PoliticalCorruption</a:t>
             </a:r>
             <a:r>
               <a:rPr lang="zh-CN" sz="1050">
@@ -17467,7 +17539,7 @@
                   <a:schemeClr val="dk1"/>
                 </a:solidFill>
               </a:rPr>
-              <a:t>Arrest</a:t>
+              <a:t>10495:arrest</a:t>
             </a:r>
             <a:r>
               <a:rPr lang="zh-CN" sz="1050">
@@ -17507,7 +17579,7 @@
                   <a:schemeClr val="dk1"/>
                 </a:solidFill>
               </a:rPr>
-              <a:t>Fine</a:t>
+              <a:t>10484:Fine</a:t>
             </a:r>
             <a:r>
               <a:rPr lang="zh-CN" sz="1050">
@@ -17646,7 +17718,7 @@
                   <a:schemeClr val="dk1"/>
                 </a:solidFill>
               </a:rPr>
-              <a:t>founding</a:t>
+              <a:t>10462:founding</a:t>
             </a:r>
             <a:r>
               <a:rPr b="0" i="0" lang="zh-CN" sz="1050" u="none" cap="none" strike="noStrike">
@@ -17698,7 +17770,7 @@
                   <a:schemeClr val="dk1"/>
                 </a:solidFill>
               </a:rPr>
-              <a:t>Fundraising</a:t>
+              <a:t>10469:Fundraising</a:t>
             </a:r>
             <a:r>
               <a:rPr lang="zh-CN" sz="1050">
@@ -17738,7 +17810,7 @@
                   <a:schemeClr val="dk1"/>
                 </a:solidFill>
               </a:rPr>
-              <a:t>PrivateFunding</a:t>
+              <a:t>10471:PrivateFunding</a:t>
             </a:r>
             <a:r>
               <a:rPr lang="zh-CN" sz="1050">
@@ -17786,7 +17858,7 @@
                   <a:schemeClr val="dk1"/>
                 </a:solidFill>
               </a:rPr>
-              <a:t>IPO</a:t>
+              <a:t>10470:IPO</a:t>
             </a:r>
             <a:r>
               <a:rPr lang="zh-CN" sz="1050">
@@ -17958,7 +18030,7 @@
         <p:spPr>
           <a:xfrm>
             <a:off x="172150" y="372900"/>
-            <a:ext cx="8139900" cy="2390700"/>
+            <a:ext cx="8139900" cy="2576700"/>
           </a:xfrm>
           <a:prstGeom prst="rect">
             <a:avLst/>
@@ -17997,7 +18069,7 @@
                   <a:schemeClr val="dk1"/>
                 </a:solidFill>
               </a:rPr>
-              <a:t>assign</a:t>
+              <a:t>10475:assign</a:t>
             </a:r>
             <a:r>
               <a:rPr b="0" i="0" lang="zh-CN" sz="1050" u="none" cap="none" strike="noStrike">
@@ -18049,7 +18121,7 @@
                   <a:schemeClr val="dk1"/>
                 </a:solidFill>
               </a:rPr>
-              <a:t>trial</a:t>
+              <a:t>10476:trial</a:t>
             </a:r>
             <a:r>
               <a:rPr lang="zh-CN" sz="1050">
@@ -18089,7 +18161,7 @@
                   <a:schemeClr val="dk1"/>
                 </a:solidFill>
               </a:rPr>
-              <a:t>Government Bailout</a:t>
+              <a:t>10480:Government Bailout</a:t>
             </a:r>
             <a:r>
               <a:rPr lang="zh-CN" sz="1050">
@@ -18097,15 +18169,7 @@
                   <a:schemeClr val="dk1"/>
                 </a:solidFill>
               </a:rPr>
-              <a:t>: </a:t>
-            </a:r>
-            <a:r>
-              <a:rPr lang="zh-CN" sz="1050">
-                <a:solidFill>
-                  <a:schemeClr val="dk1"/>
-                </a:solidFill>
-              </a:rPr>
-              <a:t>The government loans a lot of money to a company when it's 'too big too fail' without damaging the economy.</a:t>
+              <a:t>: The government loans a lot of money to a company when it's 'too big too fail' without damaging the economy.</a:t>
             </a:r>
             <a:endParaRPr sz="1050">
               <a:solidFill>
@@ -18137,7 +18201,7 @@
                   <a:schemeClr val="dk1"/>
                 </a:solidFill>
               </a:rPr>
-              <a:t>bankruptcy actions</a:t>
+              <a:t>10472:bankruptcy actions</a:t>
             </a:r>
             <a:r>
               <a:rPr lang="zh-CN" sz="1050">
@@ -18177,7 +18241,7 @@
                   <a:schemeClr val="dk1"/>
                 </a:solidFill>
               </a:rPr>
-              <a:t>Reorganization</a:t>
+              <a:t>10461:Reorganization</a:t>
             </a:r>
             <a:r>
               <a:rPr lang="zh-CN" sz="1050">
@@ -18217,7 +18281,7 @@
                   <a:schemeClr val="dk1"/>
                 </a:solidFill>
               </a:rPr>
-              <a:t>End Parternship</a:t>
+              <a:t>10482:End Parternship</a:t>
             </a:r>
             <a:r>
               <a:rPr lang="zh-CN" sz="1050">
@@ -18257,7 +18321,7 @@
                   <a:schemeClr val="dk1"/>
                 </a:solidFill>
               </a:rPr>
-              <a:t>ExitBankruptcy</a:t>
+              <a:t>10483:ExitBankruptcy</a:t>
             </a:r>
             <a:r>
               <a:rPr lang="zh-CN" sz="1050">
@@ -18297,7 +18361,7 @@
                   <a:schemeClr val="dk1"/>
                 </a:solidFill>
               </a:rPr>
-              <a:t>Shutdown</a:t>
+              <a:t>10460:Shutdown</a:t>
             </a:r>
             <a:r>
               <a:rPr lang="zh-CN" sz="1050">
@@ -18337,7 +18401,7 @@
                   <a:schemeClr val="dk1"/>
                 </a:solidFill>
               </a:rPr>
-              <a:t>acquisition</a:t>
+              <a:t>10456:acquisition</a:t>
             </a:r>
             <a:r>
               <a:rPr lang="zh-CN" sz="1050">
@@ -18377,7 +18441,7 @@
                   <a:schemeClr val="dk1"/>
                 </a:solidFill>
               </a:rPr>
-              <a:t>exchange of goods</a:t>
+              <a:t>10473:exchange of goods</a:t>
             </a:r>
             <a:r>
               <a:rPr lang="zh-CN" sz="1050">
@@ -18417,7 +18481,7 @@
                   <a:schemeClr val="dk1"/>
                 </a:solidFill>
               </a:rPr>
-              <a:t>Management Change</a:t>
+              <a:t>10479:Management Change</a:t>
             </a:r>
             <a:r>
               <a:rPr lang="zh-CN" sz="1050">
@@ -18457,7 +18521,7 @@
                   <a:schemeClr val="dk1"/>
                 </a:solidFill>
               </a:rPr>
-              <a:t>dismissal</a:t>
+              <a:t>10504:dismissal</a:t>
             </a:r>
             <a:r>
               <a:rPr lang="zh-CN" sz="1050">
@@ -18584,7 +18648,7 @@
         </p:nvSpPr>
         <p:spPr>
           <a:xfrm>
-            <a:off x="585200" y="273900"/>
+            <a:off x="356600" y="273900"/>
             <a:ext cx="8139900" cy="2390700"/>
           </a:xfrm>
           <a:prstGeom prst="rect">
@@ -18624,7 +18688,7 @@
                   <a:schemeClr val="dk1"/>
                 </a:solidFill>
               </a:rPr>
-              <a:t>Propose Acquisition</a:t>
+              <a:t>10487:Propose Acquisition</a:t>
             </a:r>
             <a:r>
               <a:rPr b="0" i="0" lang="zh-CN" sz="1050" u="none" cap="none" strike="noStrike">
@@ -18676,7 +18740,7 @@
                   <a:schemeClr val="dk1"/>
                 </a:solidFill>
               </a:rPr>
-              <a:t>Propose Merger</a:t>
+              <a:t>10486:Propose Merger</a:t>
             </a:r>
             <a:r>
               <a:rPr lang="zh-CN" sz="1050">
@@ -18684,15 +18748,7 @@
                   <a:schemeClr val="dk1"/>
                 </a:solidFill>
               </a:rPr>
-              <a:t>: </a:t>
-            </a:r>
-            <a:r>
-              <a:rPr lang="zh-CN" sz="1050">
-                <a:solidFill>
-                  <a:schemeClr val="dk1"/>
-                </a:solidFill>
-              </a:rPr>
-              <a:t>Two companies decide to try and become one company.</a:t>
+              <a:t>: Two companies decide to try and become one company.</a:t>
             </a:r>
             <a:endParaRPr sz="1050">
               <a:solidFill>
@@ -18724,7 +18780,7 @@
                   <a:schemeClr val="dk1"/>
                 </a:solidFill>
               </a:rPr>
-              <a:t>Ask Shareholders</a:t>
+              <a:t>10505:Ask Shareholders</a:t>
             </a:r>
             <a:r>
               <a:rPr lang="zh-CN" sz="1050">
@@ -18764,7 +18820,7 @@
                   <a:schemeClr val="dk1"/>
                 </a:solidFill>
               </a:rPr>
-              <a:t>Shareholder Response</a:t>
+              <a:t>10506:Shareholder Response</a:t>
             </a:r>
             <a:r>
               <a:rPr lang="zh-CN" sz="1050">
@@ -18803,7 +18859,7 @@
                   <a:schemeClr val="dk1"/>
                 </a:solidFill>
               </a:rPr>
-              <a:t>There is also a XOR version to indicate only one child answer.</a:t>
+              <a:t>There is also a XOR version (10509) to indicate only one child answer.</a:t>
             </a:r>
             <a:endParaRPr sz="1050">
               <a:solidFill>
@@ -18835,7 +18891,7 @@
                   <a:schemeClr val="dk1"/>
                 </a:solidFill>
               </a:rPr>
-              <a:t>agreement</a:t>
+              <a:t>10507,10488:agreement</a:t>
             </a:r>
             <a:r>
               <a:rPr lang="zh-CN" sz="1050">
@@ -18875,7 +18931,7 @@
                   <a:schemeClr val="dk1"/>
                 </a:solidFill>
               </a:rPr>
-              <a:t>rejection</a:t>
+              <a:t>10508,10489:rejection</a:t>
             </a:r>
             <a:r>
               <a:rPr lang="zh-CN" sz="1050">
@@ -18915,7 +18971,7 @@
                   <a:schemeClr val="dk1"/>
                 </a:solidFill>
               </a:rPr>
-              <a:t>AskRegulators: </a:t>
+              <a:t>10485:AskRegulators: </a:t>
             </a:r>
             <a:r>
               <a:rPr lang="zh-CN" sz="1050">
@@ -18955,7 +19011,7 @@
                   <a:schemeClr val="dk1"/>
                 </a:solidFill>
               </a:rPr>
-              <a:t>Regulatory Response</a:t>
+              <a:t>10491:Regulatory Response</a:t>
             </a:r>
             <a:r>
               <a:rPr lang="zh-CN" sz="1050">
@@ -18994,7 +19050,7 @@
                   <a:schemeClr val="dk1"/>
                 </a:solidFill>
               </a:rPr>
-              <a:t>There is also a XOR version to indicate only one child answer.</a:t>
+              <a:t>There is also a XOR version (10490) to indicate only one child answer.</a:t>
             </a:r>
             <a:endParaRPr sz="1050">
               <a:solidFill>
@@ -19106,7 +19162,7 @@
                   <a:schemeClr val="dk1"/>
                 </a:solidFill>
               </a:rPr>
-              <a:t>merger</a:t>
+              <a:t>10457:merger</a:t>
             </a:r>
             <a:r>
               <a:rPr b="0" i="0" lang="zh-CN" sz="1050" u="none" cap="none" strike="noStrike">
@@ -19158,7 +19214,7 @@
                   <a:schemeClr val="dk1"/>
                 </a:solidFill>
               </a:rPr>
-              <a:t>acquisition</a:t>
+              <a:t>10456:acquisition</a:t>
             </a:r>
             <a:r>
               <a:rPr lang="zh-CN" sz="1050">
@@ -19198,7 +19254,7 @@
                   <a:schemeClr val="dk1"/>
                 </a:solidFill>
               </a:rPr>
-              <a:t>dismissal</a:t>
+              <a:t>10504:dismissal</a:t>
             </a:r>
             <a:r>
               <a:rPr lang="zh-CN" sz="1050">
@@ -19238,7 +19294,7 @@
                   <a:schemeClr val="dk1"/>
                 </a:solidFill>
               </a:rPr>
-              <a:t>Management Change</a:t>
+              <a:t>10479:Management Change</a:t>
             </a:r>
             <a:r>
               <a:rPr lang="zh-CN" sz="1050">
@@ -19324,9 +19380,9 @@
 </file>
 
 <file path=ppt/theme/theme1.xml><?xml version="1.0" encoding="utf-8"?>
-<a:theme xmlns:a="http://schemas.openxmlformats.org/drawingml/2006/main" xmlns:r="http://schemas.openxmlformats.org/officeDocument/2006/relationships">
+<a:theme xmlns:a="http://schemas.openxmlformats.org/drawingml/2006/main" xmlns:r="http://schemas.openxmlformats.org/officeDocument/2006/relationships" name="Simple Light">
   <a:themeElements>
-    <a:clrScheme name="Default">
+    <a:clrScheme name="Simple Light">
       <a:dk1>
         <a:srgbClr val="000000"/>
       </a:dk1>
@@ -19334,34 +19390,34 @@
         <a:srgbClr val="FFFFFF"/>
       </a:lt1>
       <a:dk2>
-        <a:srgbClr val="158158"/>
+        <a:srgbClr val="595959"/>
       </a:dk2>
       <a:lt2>
-        <a:srgbClr val="F3F3F3"/>
+        <a:srgbClr val="EEEEEE"/>
       </a:lt2>
       <a:accent1>
-        <a:srgbClr val="058DC7"/>
+        <a:srgbClr val="4285F4"/>
       </a:accent1>
       <a:accent2>
-        <a:srgbClr val="50B432"/>
+        <a:srgbClr val="212121"/>
       </a:accent2>
       <a:accent3>
-        <a:srgbClr val="ED561B"/>
+        <a:srgbClr val="78909C"/>
       </a:accent3>
       <a:accent4>
-        <a:srgbClr val="EDEF00"/>
+        <a:srgbClr val="FFAB40"/>
       </a:accent4>
       <a:accent5>
-        <a:srgbClr val="24CBE5"/>
+        <a:srgbClr val="0097A7"/>
       </a:accent5>
       <a:accent6>
-        <a:srgbClr val="64E572"/>
+        <a:srgbClr val="EEFF41"/>
       </a:accent6>
       <a:hlink>
-        <a:srgbClr val="2200CC"/>
+        <a:srgbClr val="0097A7"/>
       </a:hlink>
       <a:folHlink>
-        <a:srgbClr val="551A8B"/>
+        <a:srgbClr val="0097A7"/>
       </a:folHlink>
     </a:clrScheme>
     <a:fontScheme name="Office">
@@ -19603,9 +19659,9 @@
 </file>
 
 <file path=ppt/theme/theme2.xml><?xml version="1.0" encoding="utf-8"?>
-<a:theme xmlns:a="http://schemas.openxmlformats.org/drawingml/2006/main" xmlns:r="http://schemas.openxmlformats.org/officeDocument/2006/relationships" name="Simple Light">
+<a:theme xmlns:a="http://schemas.openxmlformats.org/drawingml/2006/main" xmlns:r="http://schemas.openxmlformats.org/officeDocument/2006/relationships">
   <a:themeElements>
-    <a:clrScheme name="Simple Light">
+    <a:clrScheme name="Default">
       <a:dk1>
         <a:srgbClr val="000000"/>
       </a:dk1>
@@ -19613,34 +19669,34 @@
         <a:srgbClr val="FFFFFF"/>
       </a:lt1>
       <a:dk2>
-        <a:srgbClr val="595959"/>
+        <a:srgbClr val="158158"/>
       </a:dk2>
       <a:lt2>
-        <a:srgbClr val="EEEEEE"/>
+        <a:srgbClr val="F3F3F3"/>
       </a:lt2>
       <a:accent1>
-        <a:srgbClr val="4285F4"/>
+        <a:srgbClr val="058DC7"/>
       </a:accent1>
       <a:accent2>
-        <a:srgbClr val="212121"/>
+        <a:srgbClr val="50B432"/>
       </a:accent2>
       <a:accent3>
-        <a:srgbClr val="78909C"/>
+        <a:srgbClr val="ED561B"/>
       </a:accent3>
       <a:accent4>
-        <a:srgbClr val="FFAB40"/>
+        <a:srgbClr val="EDEF00"/>
       </a:accent4>
       <a:accent5>
-        <a:srgbClr val="0097A7"/>
+        <a:srgbClr val="24CBE5"/>
       </a:accent5>
       <a:accent6>
-        <a:srgbClr val="EEFF41"/>
+        <a:srgbClr val="64E572"/>
       </a:accent6>
       <a:hlink>
-        <a:srgbClr val="0097A7"/>
+        <a:srgbClr val="2200CC"/>
       </a:hlink>
       <a:folHlink>
-        <a:srgbClr val="0097A7"/>
+        <a:srgbClr val="551A8B"/>
       </a:folHlink>
     </a:clrScheme>
     <a:fontScheme name="Office">

</xml_diff>